<commit_message>
little libs are ready
</commit_message>
<xml_diff>
--- a/docs/Libraries.pptx
+++ b/docs/Libraries.pptx
@@ -3095,6 +3095,87 @@
           <a:chExt cx="0" cy="0"/>
         </a:xfrm>
       </p:grpSpPr>
+      <p:cxnSp>
+        <p:nvCxnSpPr>
+          <p:cNvPr id="199" name="Straight Arrow Connector 198"/>
+          <p:cNvCxnSpPr>
+            <a:stCxn id="13" idx="0"/>
+            <a:endCxn id="7" idx="1"/>
+          </p:cNvCxnSpPr>
+          <p:nvPr/>
+        </p:nvCxnSpPr>
+        <p:spPr>
+          <a:xfrm flipV="1">
+            <a:off x="2671106" y="342222"/>
+            <a:ext cx="2302284" cy="526705"/>
+          </a:xfrm>
+          <a:prstGeom prst="straightConnector1">
+            <a:avLst/>
+          </a:prstGeom>
+          <a:ln w="38100">
+            <a:solidFill>
+              <a:schemeClr val="accent3">
+                <a:lumMod val="40000"/>
+                <a:lumOff val="60000"/>
+              </a:schemeClr>
+            </a:solidFill>
+            <a:tailEnd type="arrow"/>
+          </a:ln>
+        </p:spPr>
+        <p:style>
+          <a:lnRef idx="1">
+            <a:schemeClr val="accent1"/>
+          </a:lnRef>
+          <a:fillRef idx="0">
+            <a:schemeClr val="accent1"/>
+          </a:fillRef>
+          <a:effectRef idx="0">
+            <a:schemeClr val="accent1"/>
+          </a:effectRef>
+          <a:fontRef idx="minor">
+            <a:schemeClr val="tx1"/>
+          </a:fontRef>
+        </p:style>
+      </p:cxnSp>
+      <p:cxnSp>
+        <p:nvCxnSpPr>
+          <p:cNvPr id="200" name="Straight Arrow Connector 199"/>
+          <p:cNvCxnSpPr>
+            <a:stCxn id="10" idx="0"/>
+            <a:endCxn id="7" idx="2"/>
+          </p:cNvCxnSpPr>
+          <p:nvPr/>
+        </p:nvCxnSpPr>
+        <p:spPr>
+          <a:xfrm flipV="1">
+            <a:off x="5909494" y="558246"/>
+            <a:ext cx="0" cy="310681"/>
+          </a:xfrm>
+          <a:prstGeom prst="straightConnector1">
+            <a:avLst/>
+          </a:prstGeom>
+          <a:ln w="38100">
+            <a:solidFill>
+              <a:srgbClr val="BED395"/>
+            </a:solidFill>
+            <a:tailEnd type="arrow"/>
+          </a:ln>
+        </p:spPr>
+        <p:style>
+          <a:lnRef idx="1">
+            <a:schemeClr val="accent1"/>
+          </a:lnRef>
+          <a:fillRef idx="0">
+            <a:schemeClr val="accent1"/>
+          </a:fillRef>
+          <a:effectRef idx="0">
+            <a:schemeClr val="accent1"/>
+          </a:effectRef>
+          <a:fontRef idx="minor">
+            <a:schemeClr val="tx1"/>
+          </a:fontRef>
+        </p:style>
+      </p:cxnSp>
       <p:sp>
         <p:nvSpPr>
           <p:cNvPr id="4" name="Rectangle 3"/>
@@ -3103,7 +3184,7 @@
         </p:nvSpPr>
         <p:spPr>
           <a:xfrm>
-            <a:off x="2480255" y="2477742"/>
+            <a:off x="6976049" y="3634037"/>
             <a:ext cx="1872208" cy="432048"/>
           </a:xfrm>
           <a:prstGeom prst="rect">
@@ -3152,13 +3233,13 @@
       </p:sp>
       <p:sp>
         <p:nvSpPr>
-          <p:cNvPr id="5" name="Rectangle 4"/>
+          <p:cNvPr id="7" name="Rectangle 6"/>
           <p:cNvSpPr/>
           <p:nvPr/>
         </p:nvSpPr>
         <p:spPr>
           <a:xfrm>
-            <a:off x="521569" y="3284984"/>
+            <a:off x="4973390" y="126198"/>
             <a:ext cx="1872208" cy="432048"/>
           </a:xfrm>
           <a:prstGeom prst="rect">
@@ -3196,21 +3277,25 @@
             <a:pPr algn="ctr"/>
             <a:r>
               <a:rPr lang="en-US" dirty="0" err="1" smtClean="0"/>
-              <a:t>mo-json</a:t>
-            </a:r>
-            <a:endParaRPr lang="en-US" dirty="0" smtClean="0"/>
-          </a:p>
-        </p:txBody>
-      </p:sp>
-      <p:sp>
-        <p:nvSpPr>
-          <p:cNvPr id="6" name="Rectangle 5"/>
+              <a:t>mo</a:t>
+            </a:r>
+            <a:r>
+              <a:rPr lang="en-US" dirty="0" smtClean="0"/>
+              <a:t>-threads</a:t>
+            </a:r>
+            <a:endParaRPr lang="en-US" dirty="0"/>
+          </a:p>
+        </p:txBody>
+      </p:sp>
+      <p:sp>
+        <p:nvSpPr>
+          <p:cNvPr id="8" name="Rectangle 7"/>
           <p:cNvSpPr/>
           <p:nvPr/>
         </p:nvSpPr>
         <p:spPr>
           <a:xfrm>
-            <a:off x="4932040" y="3140968"/>
+            <a:off x="313218" y="4456026"/>
             <a:ext cx="1872208" cy="432048"/>
           </a:xfrm>
           <a:prstGeom prst="rect">
@@ -3252,7 +3337,7 @@
             </a:r>
             <a:r>
               <a:rPr lang="en-US" dirty="0" smtClean="0"/>
-              <a:t>-collections</a:t>
+              <a:t>-testing</a:t>
             </a:r>
             <a:endParaRPr lang="en-US" dirty="0"/>
           </a:p>
@@ -3260,13 +3345,13 @@
       </p:sp>
       <p:sp>
         <p:nvSpPr>
-          <p:cNvPr id="7" name="Rectangle 6"/>
+          <p:cNvPr id="11" name="Rectangle 10"/>
           <p:cNvSpPr/>
           <p:nvPr/>
         </p:nvSpPr>
         <p:spPr>
           <a:xfrm>
-            <a:off x="6358090" y="4895056"/>
+            <a:off x="1735002" y="5891482"/>
             <a:ext cx="1872208" cy="432048"/>
           </a:xfrm>
           <a:prstGeom prst="rect">
@@ -3304,11 +3389,7 @@
             <a:pPr algn="ctr"/>
             <a:r>
               <a:rPr lang="en-US" dirty="0" err="1" smtClean="0"/>
-              <a:t>mo</a:t>
-            </a:r>
-            <a:r>
-              <a:rPr lang="en-US" dirty="0" smtClean="0"/>
-              <a:t>-threads</a:t>
+              <a:t>mo-json-config</a:t>
             </a:r>
             <a:endParaRPr lang="en-US" dirty="0"/>
           </a:p>
@@ -3316,13 +3397,13 @@
       </p:sp>
       <p:sp>
         <p:nvSpPr>
-          <p:cNvPr id="8" name="Rectangle 7"/>
+          <p:cNvPr id="12" name="Rectangle 11"/>
           <p:cNvSpPr/>
           <p:nvPr/>
         </p:nvSpPr>
         <p:spPr>
           <a:xfrm>
-            <a:off x="2766164" y="3909817"/>
+            <a:off x="1735002" y="126198"/>
             <a:ext cx="1872208" cy="432048"/>
           </a:xfrm>
           <a:prstGeom prst="rect">
@@ -3364,7 +3445,7 @@
             </a:r>
             <a:r>
               <a:rPr lang="en-US" dirty="0" smtClean="0"/>
-              <a:t>-testing</a:t>
+              <a:t>-files</a:t>
             </a:r>
             <a:endParaRPr lang="en-US" dirty="0"/>
           </a:p>
@@ -3372,13 +3453,13 @@
       </p:sp>
       <p:sp>
         <p:nvSpPr>
-          <p:cNvPr id="11" name="Rectangle 10"/>
+          <p:cNvPr id="13" name="Rectangle 12"/>
           <p:cNvSpPr/>
           <p:nvPr/>
         </p:nvSpPr>
         <p:spPr>
           <a:xfrm>
-            <a:off x="521569" y="5013176"/>
+            <a:off x="1735002" y="868927"/>
             <a:ext cx="1872208" cy="432048"/>
           </a:xfrm>
           <a:prstGeom prst="rect">
@@ -3416,114 +3497,6 @@
             <a:pPr algn="ctr"/>
             <a:r>
               <a:rPr lang="en-US" dirty="0" err="1" smtClean="0"/>
-              <a:t>mo-json-config</a:t>
-            </a:r>
-            <a:endParaRPr lang="en-US" dirty="0"/>
-          </a:p>
-        </p:txBody>
-      </p:sp>
-      <p:sp>
-        <p:nvSpPr>
-          <p:cNvPr id="12" name="Rectangle 11"/>
-          <p:cNvSpPr/>
-          <p:nvPr/>
-        </p:nvSpPr>
-        <p:spPr>
-          <a:xfrm>
-            <a:off x="6084168" y="1405199"/>
-            <a:ext cx="1872208" cy="432048"/>
-          </a:xfrm>
-          <a:prstGeom prst="rect">
-            <a:avLst/>
-          </a:prstGeom>
-          <a:solidFill>
-            <a:srgbClr val="683104"/>
-          </a:solidFill>
-          <a:ln>
-            <a:solidFill>
-              <a:srgbClr val="210F01"/>
-            </a:solidFill>
-          </a:ln>
-        </p:spPr>
-        <p:style>
-          <a:lnRef idx="2">
-            <a:schemeClr val="accent1">
-              <a:shade val="50000"/>
-            </a:schemeClr>
-          </a:lnRef>
-          <a:fillRef idx="1">
-            <a:schemeClr val="accent1"/>
-          </a:fillRef>
-          <a:effectRef idx="0">
-            <a:schemeClr val="accent1"/>
-          </a:effectRef>
-          <a:fontRef idx="minor">
-            <a:schemeClr val="lt1"/>
-          </a:fontRef>
-        </p:style>
-        <p:txBody>
-          <a:bodyPr rtlCol="0" anchor="ctr"/>
-          <a:lstStyle/>
-          <a:p>
-            <a:pPr algn="ctr"/>
-            <a:r>
-              <a:rPr lang="en-US" dirty="0" err="1" smtClean="0"/>
-              <a:t>mo</a:t>
-            </a:r>
-            <a:r>
-              <a:rPr lang="en-US" dirty="0" smtClean="0"/>
-              <a:t>-files</a:t>
-            </a:r>
-            <a:endParaRPr lang="en-US" dirty="0"/>
-          </a:p>
-        </p:txBody>
-      </p:sp>
-      <p:sp>
-        <p:nvSpPr>
-          <p:cNvPr id="13" name="Rectangle 12"/>
-          <p:cNvSpPr/>
-          <p:nvPr/>
-        </p:nvSpPr>
-        <p:spPr>
-          <a:xfrm>
-            <a:off x="1735002" y="332656"/>
-            <a:ext cx="1872208" cy="432048"/>
-          </a:xfrm>
-          <a:prstGeom prst="rect">
-            <a:avLst/>
-          </a:prstGeom>
-          <a:solidFill>
-            <a:srgbClr val="683104"/>
-          </a:solidFill>
-          <a:ln>
-            <a:solidFill>
-              <a:srgbClr val="210F01"/>
-            </a:solidFill>
-          </a:ln>
-        </p:spPr>
-        <p:style>
-          <a:lnRef idx="2">
-            <a:schemeClr val="accent1">
-              <a:shade val="50000"/>
-            </a:schemeClr>
-          </a:lnRef>
-          <a:fillRef idx="1">
-            <a:schemeClr val="accent1"/>
-          </a:fillRef>
-          <a:effectRef idx="0">
-            <a:schemeClr val="accent1"/>
-          </a:effectRef>
-          <a:fontRef idx="minor">
-            <a:schemeClr val="lt1"/>
-          </a:fontRef>
-        </p:style>
-        <p:txBody>
-          <a:bodyPr rtlCol="0" anchor="ctr"/>
-          <a:lstStyle/>
-          <a:p>
-            <a:pPr algn="ctr"/>
-            <a:r>
-              <a:rPr lang="en-US" dirty="0" err="1" smtClean="0"/>
               <a:t>mo</a:t>
             </a:r>
             <a:r>
@@ -3544,7 +3517,7 @@
         </p:nvCxnSpPr>
         <p:spPr>
           <a:xfrm>
-            <a:off x="3607210" y="548680"/>
+            <a:off x="3607210" y="1084951"/>
             <a:ext cx="1366180" cy="0"/>
           </a:xfrm>
           <a:prstGeom prst="straightConnector1">
@@ -3584,9 +3557,9 @@
           <p:nvPr/>
         </p:nvCxnSpPr>
         <p:spPr>
-          <a:xfrm flipH="1">
-            <a:off x="1457673" y="764704"/>
-            <a:ext cx="1213433" cy="2520280"/>
+          <a:xfrm>
+            <a:off x="2671106" y="1300975"/>
+            <a:ext cx="3239205" cy="4590507"/>
           </a:xfrm>
           <a:prstGeom prst="straightConnector1">
             <a:avLst/>
@@ -3594,7 +3567,8 @@
           <a:ln w="38100">
             <a:solidFill>
               <a:schemeClr val="accent3">
-                <a:lumMod val="75000"/>
+                <a:lumMod val="40000"/>
+                <a:lumOff val="60000"/>
               </a:schemeClr>
             </a:solidFill>
             <a:tailEnd type="arrow"/>
@@ -3619,15 +3593,15 @@
         <p:nvCxnSpPr>
           <p:cNvPr id="23" name="Straight Arrow Connector 22"/>
           <p:cNvCxnSpPr>
-            <a:stCxn id="5" idx="2"/>
-            <a:endCxn id="11" idx="0"/>
+            <a:stCxn id="5" idx="1"/>
+            <a:endCxn id="11" idx="3"/>
           </p:cNvCxnSpPr>
           <p:nvPr/>
         </p:nvCxnSpPr>
         <p:spPr>
-          <a:xfrm>
-            <a:off x="1457673" y="3717032"/>
-            <a:ext cx="0" cy="1296144"/>
+          <a:xfrm flipH="1">
+            <a:off x="3607210" y="6107506"/>
+            <a:ext cx="1366997" cy="0"/>
           </a:xfrm>
           <a:prstGeom prst="straightConnector1">
             <a:avLst/>
@@ -3666,18 +3640,16 @@
           <p:nvPr/>
         </p:nvCxnSpPr>
         <p:spPr>
-          <a:xfrm flipH="1">
-            <a:off x="3416359" y="764704"/>
-            <a:ext cx="2493135" cy="1713038"/>
+          <a:xfrm>
+            <a:off x="5909494" y="1300975"/>
+            <a:ext cx="2002659" cy="2333062"/>
           </a:xfrm>
           <a:prstGeom prst="straightConnector1">
             <a:avLst/>
           </a:prstGeom>
           <a:ln w="38100">
             <a:solidFill>
-              <a:schemeClr val="accent3">
-                <a:lumMod val="75000"/>
-              </a:schemeClr>
+              <a:srgbClr val="BED395"/>
             </a:solidFill>
             <a:tailEnd type="arrow"/>
           </a:ln>
@@ -3702,14 +3674,14 @@
           <p:cNvPr id="27" name="Straight Arrow Connector 26"/>
           <p:cNvCxnSpPr>
             <a:stCxn id="13" idx="2"/>
-            <a:endCxn id="4" idx="0"/>
+            <a:endCxn id="4" idx="1"/>
           </p:cNvCxnSpPr>
           <p:nvPr/>
         </p:nvCxnSpPr>
         <p:spPr>
           <a:xfrm>
-            <a:off x="2671106" y="764704"/>
-            <a:ext cx="745253" cy="1713038"/>
+            <a:off x="2671106" y="1300975"/>
+            <a:ext cx="4304943" cy="2549086"/>
           </a:xfrm>
           <a:prstGeom prst="straightConnector1">
             <a:avLst/>
@@ -3717,7 +3689,8 @@
           <a:ln w="38100">
             <a:solidFill>
               <a:schemeClr val="accent3">
-                <a:lumMod val="75000"/>
+                <a:lumMod val="40000"/>
+                <a:lumOff val="60000"/>
               </a:schemeClr>
             </a:solidFill>
             <a:tailEnd type="arrow"/>
@@ -3749,8 +3722,8 @@
         </p:nvCxnSpPr>
         <p:spPr>
           <a:xfrm flipH="1">
-            <a:off x="3416359" y="1837247"/>
-            <a:ext cx="435561" cy="640495"/>
+            <a:off x="7912153" y="2687726"/>
+            <a:ext cx="28894" cy="946311"/>
           </a:xfrm>
           <a:prstGeom prst="straightConnector1">
             <a:avLst/>
@@ -3789,9 +3762,226 @@
           <p:nvPr/>
         </p:nvCxnSpPr>
         <p:spPr>
+          <a:xfrm>
+            <a:off x="5909494" y="1300975"/>
+            <a:ext cx="2031553" cy="954703"/>
+          </a:xfrm>
+          <a:prstGeom prst="straightConnector1">
+            <a:avLst/>
+          </a:prstGeom>
+          <a:ln w="38100">
+            <a:solidFill>
+              <a:srgbClr val="BED395"/>
+            </a:solidFill>
+            <a:tailEnd type="arrow"/>
+          </a:ln>
+        </p:spPr>
+        <p:style>
+          <a:lnRef idx="1">
+            <a:schemeClr val="accent1"/>
+          </a:lnRef>
+          <a:fillRef idx="0">
+            <a:schemeClr val="accent1"/>
+          </a:fillRef>
+          <a:effectRef idx="0">
+            <a:schemeClr val="accent1"/>
+          </a:effectRef>
+          <a:fontRef idx="minor">
+            <a:schemeClr val="tx1"/>
+          </a:fontRef>
+        </p:style>
+      </p:cxnSp>
+      <p:sp>
+        <p:nvSpPr>
+          <p:cNvPr id="10" name="Rectangle 9"/>
+          <p:cNvSpPr/>
+          <p:nvPr/>
+        </p:nvSpPr>
+        <p:spPr>
+          <a:xfrm>
+            <a:off x="4973390" y="868927"/>
+            <a:ext cx="1872208" cy="432048"/>
+          </a:xfrm>
+          <a:prstGeom prst="rect">
+            <a:avLst/>
+          </a:prstGeom>
+          <a:solidFill>
+            <a:srgbClr val="683104"/>
+          </a:solidFill>
+          <a:ln>
+            <a:solidFill>
+              <a:srgbClr val="210F01"/>
+            </a:solidFill>
+          </a:ln>
+        </p:spPr>
+        <p:style>
+          <a:lnRef idx="2">
+            <a:schemeClr val="accent1">
+              <a:shade val="50000"/>
+            </a:schemeClr>
+          </a:lnRef>
+          <a:fillRef idx="1">
+            <a:schemeClr val="accent1"/>
+          </a:fillRef>
+          <a:effectRef idx="0">
+            <a:schemeClr val="accent1"/>
+          </a:effectRef>
+          <a:fontRef idx="minor">
+            <a:schemeClr val="lt1"/>
+          </a:fontRef>
+        </p:style>
+        <p:txBody>
+          <a:bodyPr rtlCol="0" anchor="ctr"/>
+          <a:lstStyle/>
+          <a:p>
+            <a:pPr algn="ctr"/>
+            <a:r>
+              <a:rPr lang="en-US" dirty="0" err="1" smtClean="0"/>
+              <a:t>mo</a:t>
+            </a:r>
+            <a:r>
+              <a:rPr lang="en-US" dirty="0" smtClean="0"/>
+              <a:t>-logs</a:t>
+            </a:r>
+          </a:p>
+        </p:txBody>
+      </p:sp>
+      <p:cxnSp>
+        <p:nvCxnSpPr>
+          <p:cNvPr id="63" name="Straight Arrow Connector 62"/>
+          <p:cNvCxnSpPr>
+            <a:stCxn id="13" idx="0"/>
+            <a:endCxn id="12" idx="2"/>
+          </p:cNvCxnSpPr>
+          <p:nvPr/>
+        </p:nvCxnSpPr>
+        <p:spPr>
+          <a:xfrm flipV="1">
+            <a:off x="2671106" y="558246"/>
+            <a:ext cx="0" cy="310681"/>
+          </a:xfrm>
+          <a:prstGeom prst="straightConnector1">
+            <a:avLst/>
+          </a:prstGeom>
+          <a:ln w="38100">
+            <a:solidFill>
+              <a:schemeClr val="accent3">
+                <a:lumMod val="40000"/>
+                <a:lumOff val="60000"/>
+              </a:schemeClr>
+            </a:solidFill>
+            <a:tailEnd type="arrow"/>
+          </a:ln>
+        </p:spPr>
+        <p:style>
+          <a:lnRef idx="1">
+            <a:schemeClr val="accent1"/>
+          </a:lnRef>
+          <a:fillRef idx="0">
+            <a:schemeClr val="accent1"/>
+          </a:fillRef>
+          <a:effectRef idx="0">
+            <a:schemeClr val="accent1"/>
+          </a:effectRef>
+          <a:fontRef idx="minor">
+            <a:schemeClr val="tx1"/>
+          </a:fontRef>
+        </p:style>
+      </p:cxnSp>
+      <p:cxnSp>
+        <p:nvCxnSpPr>
+          <p:cNvPr id="64" name="Straight Arrow Connector 63"/>
+          <p:cNvCxnSpPr>
+            <a:stCxn id="10" idx="0"/>
+            <a:endCxn id="12" idx="3"/>
+          </p:cNvCxnSpPr>
+          <p:nvPr/>
+        </p:nvCxnSpPr>
+        <p:spPr>
+          <a:xfrm flipH="1" flipV="1">
+            <a:off x="3607210" y="342222"/>
+            <a:ext cx="2302284" cy="526705"/>
+          </a:xfrm>
+          <a:prstGeom prst="straightConnector1">
+            <a:avLst/>
+          </a:prstGeom>
+          <a:ln w="38100">
+            <a:solidFill>
+              <a:srgbClr val="BED395"/>
+            </a:solidFill>
+            <a:tailEnd type="arrow"/>
+          </a:ln>
+        </p:spPr>
+        <p:style>
+          <a:lnRef idx="1">
+            <a:schemeClr val="accent1"/>
+          </a:lnRef>
+          <a:fillRef idx="0">
+            <a:schemeClr val="accent1"/>
+          </a:fillRef>
+          <a:effectRef idx="0">
+            <a:schemeClr val="accent1"/>
+          </a:effectRef>
+          <a:fontRef idx="minor">
+            <a:schemeClr val="tx1"/>
+          </a:fontRef>
+        </p:style>
+      </p:cxnSp>
+      <p:cxnSp>
+        <p:nvCxnSpPr>
+          <p:cNvPr id="114" name="Straight Arrow Connector 113"/>
+          <p:cNvCxnSpPr>
+            <a:stCxn id="13" idx="2"/>
+            <a:endCxn id="6" idx="0"/>
+          </p:cNvCxnSpPr>
+          <p:nvPr/>
+        </p:nvCxnSpPr>
+        <p:spPr>
           <a:xfrm flipH="1">
-            <a:off x="3851920" y="764704"/>
-            <a:ext cx="2057574" cy="640495"/>
+            <a:off x="1249322" y="1300975"/>
+            <a:ext cx="1421784" cy="1822211"/>
+          </a:xfrm>
+          <a:prstGeom prst="straightConnector1">
+            <a:avLst/>
+          </a:prstGeom>
+          <a:ln w="38100">
+            <a:solidFill>
+              <a:schemeClr val="accent3">
+                <a:lumMod val="40000"/>
+                <a:lumOff val="60000"/>
+              </a:schemeClr>
+            </a:solidFill>
+            <a:tailEnd type="arrow"/>
+          </a:ln>
+        </p:spPr>
+        <p:style>
+          <a:lnRef idx="1">
+            <a:schemeClr val="accent1"/>
+          </a:lnRef>
+          <a:fillRef idx="0">
+            <a:schemeClr val="accent1"/>
+          </a:fillRef>
+          <a:effectRef idx="0">
+            <a:schemeClr val="accent1"/>
+          </a:effectRef>
+          <a:fontRef idx="minor">
+            <a:schemeClr val="tx1"/>
+          </a:fontRef>
+        </p:style>
+      </p:cxnSp>
+      <p:cxnSp>
+        <p:nvCxnSpPr>
+          <p:cNvPr id="115" name="Straight Arrow Connector 114"/>
+          <p:cNvCxnSpPr>
+            <a:stCxn id="113" idx="2"/>
+            <a:endCxn id="6" idx="0"/>
+          </p:cNvCxnSpPr>
+          <p:nvPr/>
+        </p:nvCxnSpPr>
+        <p:spPr>
+          <a:xfrm>
+            <a:off x="1249322" y="2484683"/>
+            <a:ext cx="0" cy="638503"/>
           </a:xfrm>
           <a:prstGeom prst="straightConnector1">
             <a:avLst/>
@@ -3822,17 +4012,557 @@
       </p:cxnSp>
       <p:cxnSp>
         <p:nvCxnSpPr>
+          <p:cNvPr id="215" name="Straight Arrow Connector 214"/>
+          <p:cNvCxnSpPr>
+            <a:stCxn id="10" idx="2"/>
+            <a:endCxn id="5" idx="0"/>
+          </p:cNvCxnSpPr>
+          <p:nvPr/>
+        </p:nvCxnSpPr>
+        <p:spPr>
+          <a:xfrm>
+            <a:off x="5909494" y="1300975"/>
+            <a:ext cx="817" cy="4590507"/>
+          </a:xfrm>
+          <a:prstGeom prst="straightConnector1">
+            <a:avLst/>
+          </a:prstGeom>
+          <a:ln w="38100">
+            <a:solidFill>
+              <a:srgbClr val="BED395"/>
+            </a:solidFill>
+            <a:tailEnd type="arrow"/>
+          </a:ln>
+        </p:spPr>
+        <p:style>
+          <a:lnRef idx="1">
+            <a:schemeClr val="accent1"/>
+          </a:lnRef>
+          <a:fillRef idx="0">
+            <a:schemeClr val="accent1"/>
+          </a:fillRef>
+          <a:effectRef idx="0">
+            <a:schemeClr val="accent1"/>
+          </a:effectRef>
+          <a:fontRef idx="minor">
+            <a:schemeClr val="tx1"/>
+          </a:fontRef>
+        </p:style>
+      </p:cxnSp>
+      <p:cxnSp>
+        <p:nvCxnSpPr>
+          <p:cNvPr id="231" name="Straight Arrow Connector 230"/>
+          <p:cNvCxnSpPr>
+            <a:stCxn id="13" idx="2"/>
+            <a:endCxn id="11" idx="0"/>
+          </p:cNvCxnSpPr>
+          <p:nvPr/>
+        </p:nvCxnSpPr>
+        <p:spPr>
+          <a:xfrm>
+            <a:off x="2671106" y="1300975"/>
+            <a:ext cx="0" cy="4590507"/>
+          </a:xfrm>
+          <a:prstGeom prst="straightConnector1">
+            <a:avLst/>
+          </a:prstGeom>
+          <a:ln w="38100">
+            <a:solidFill>
+              <a:schemeClr val="accent3">
+                <a:lumMod val="40000"/>
+                <a:lumOff val="60000"/>
+              </a:schemeClr>
+            </a:solidFill>
+            <a:tailEnd type="arrow"/>
+          </a:ln>
+        </p:spPr>
+        <p:style>
+          <a:lnRef idx="1">
+            <a:schemeClr val="accent1"/>
+          </a:lnRef>
+          <a:fillRef idx="0">
+            <a:schemeClr val="accent1"/>
+          </a:fillRef>
+          <a:effectRef idx="0">
+            <a:schemeClr val="accent1"/>
+          </a:effectRef>
+          <a:fontRef idx="minor">
+            <a:schemeClr val="tx1"/>
+          </a:fontRef>
+        </p:style>
+      </p:cxnSp>
+      <p:cxnSp>
+        <p:nvCxnSpPr>
+          <p:cNvPr id="232" name="Straight Arrow Connector 231"/>
+          <p:cNvCxnSpPr>
+            <a:stCxn id="10" idx="2"/>
+            <a:endCxn id="11" idx="0"/>
+          </p:cNvCxnSpPr>
+          <p:nvPr/>
+        </p:nvCxnSpPr>
+        <p:spPr>
+          <a:xfrm flipH="1">
+            <a:off x="2671106" y="1300975"/>
+            <a:ext cx="3238388" cy="4590507"/>
+          </a:xfrm>
+          <a:prstGeom prst="straightConnector1">
+            <a:avLst/>
+          </a:prstGeom>
+          <a:ln w="38100">
+            <a:solidFill>
+              <a:srgbClr val="BED395"/>
+            </a:solidFill>
+            <a:tailEnd type="arrow"/>
+          </a:ln>
+        </p:spPr>
+        <p:style>
+          <a:lnRef idx="1">
+            <a:schemeClr val="accent1"/>
+          </a:lnRef>
+          <a:fillRef idx="0">
+            <a:schemeClr val="accent1"/>
+          </a:fillRef>
+          <a:effectRef idx="0">
+            <a:schemeClr val="accent1"/>
+          </a:effectRef>
+          <a:fontRef idx="minor">
+            <a:schemeClr val="tx1"/>
+          </a:fontRef>
+        </p:style>
+      </p:cxnSp>
+      <p:cxnSp>
+        <p:nvCxnSpPr>
+          <p:cNvPr id="240" name="Straight Arrow Connector 239"/>
+          <p:cNvCxnSpPr>
+            <a:stCxn id="10" idx="2"/>
+            <a:endCxn id="8" idx="3"/>
+          </p:cNvCxnSpPr>
+          <p:nvPr/>
+        </p:nvCxnSpPr>
+        <p:spPr>
+          <a:xfrm flipH="1">
+            <a:off x="2185426" y="1300975"/>
+            <a:ext cx="3724068" cy="3371075"/>
+          </a:xfrm>
+          <a:prstGeom prst="straightConnector1">
+            <a:avLst/>
+          </a:prstGeom>
+          <a:ln w="38100">
+            <a:solidFill>
+              <a:srgbClr val="BED395"/>
+            </a:solidFill>
+            <a:tailEnd type="arrow"/>
+          </a:ln>
+        </p:spPr>
+        <p:style>
+          <a:lnRef idx="1">
+            <a:schemeClr val="accent1"/>
+          </a:lnRef>
+          <a:fillRef idx="0">
+            <a:schemeClr val="accent1"/>
+          </a:fillRef>
+          <a:effectRef idx="0">
+            <a:schemeClr val="accent1"/>
+          </a:effectRef>
+          <a:fontRef idx="minor">
+            <a:schemeClr val="tx1"/>
+          </a:fontRef>
+        </p:style>
+      </p:cxnSp>
+      <p:cxnSp>
+        <p:nvCxnSpPr>
+          <p:cNvPr id="241" name="Straight Arrow Connector 240"/>
+          <p:cNvCxnSpPr>
+            <a:stCxn id="13" idx="2"/>
+            <a:endCxn id="8" idx="0"/>
+          </p:cNvCxnSpPr>
+          <p:nvPr/>
+        </p:nvCxnSpPr>
+        <p:spPr>
+          <a:xfrm flipH="1">
+            <a:off x="1249322" y="1300975"/>
+            <a:ext cx="1421784" cy="3155051"/>
+          </a:xfrm>
+          <a:prstGeom prst="straightConnector1">
+            <a:avLst/>
+          </a:prstGeom>
+          <a:ln w="38100">
+            <a:solidFill>
+              <a:schemeClr val="accent3">
+                <a:lumMod val="40000"/>
+                <a:lumOff val="60000"/>
+              </a:schemeClr>
+            </a:solidFill>
+            <a:tailEnd type="arrow"/>
+          </a:ln>
+        </p:spPr>
+        <p:style>
+          <a:lnRef idx="1">
+            <a:schemeClr val="accent1"/>
+          </a:lnRef>
+          <a:fillRef idx="0">
+            <a:schemeClr val="accent1"/>
+          </a:fillRef>
+          <a:effectRef idx="0">
+            <a:schemeClr val="accent1"/>
+          </a:effectRef>
+          <a:fontRef idx="minor">
+            <a:schemeClr val="tx1"/>
+          </a:fontRef>
+        </p:style>
+      </p:cxnSp>
+      <p:sp>
+        <p:nvSpPr>
+          <p:cNvPr id="113" name="Rectangle 112"/>
+          <p:cNvSpPr/>
+          <p:nvPr/>
+        </p:nvSpPr>
+        <p:spPr>
+          <a:xfrm>
+            <a:off x="313218" y="2052635"/>
+            <a:ext cx="1872208" cy="432048"/>
+          </a:xfrm>
+          <a:prstGeom prst="rect">
+            <a:avLst/>
+          </a:prstGeom>
+          <a:solidFill>
+            <a:srgbClr val="683104"/>
+          </a:solidFill>
+          <a:ln>
+            <a:solidFill>
+              <a:srgbClr val="210F01"/>
+            </a:solidFill>
+          </a:ln>
+        </p:spPr>
+        <p:style>
+          <a:lnRef idx="2">
+            <a:schemeClr val="accent1">
+              <a:shade val="50000"/>
+            </a:schemeClr>
+          </a:lnRef>
+          <a:fillRef idx="1">
+            <a:schemeClr val="accent1"/>
+          </a:fillRef>
+          <a:effectRef idx="0">
+            <a:schemeClr val="accent1"/>
+          </a:effectRef>
+          <a:fontRef idx="minor">
+            <a:schemeClr val="lt1"/>
+          </a:fontRef>
+        </p:style>
+        <p:txBody>
+          <a:bodyPr rtlCol="0" anchor="ctr"/>
+          <a:lstStyle/>
+          <a:p>
+            <a:pPr algn="ctr"/>
+            <a:r>
+              <a:rPr lang="en-US" dirty="0" err="1" smtClean="0"/>
+              <a:t>mo-kwargs</a:t>
+            </a:r>
+            <a:endParaRPr lang="en-US" dirty="0"/>
+          </a:p>
+        </p:txBody>
+      </p:sp>
+      <p:sp>
+        <p:nvSpPr>
+          <p:cNvPr id="9" name="Rectangle 8"/>
+          <p:cNvSpPr/>
+          <p:nvPr/>
+        </p:nvSpPr>
+        <p:spPr>
+          <a:xfrm>
+            <a:off x="7004943" y="2255678"/>
+            <a:ext cx="1872208" cy="432048"/>
+          </a:xfrm>
+          <a:prstGeom prst="rect">
+            <a:avLst/>
+          </a:prstGeom>
+          <a:solidFill>
+            <a:srgbClr val="683104"/>
+          </a:solidFill>
+          <a:ln>
+            <a:solidFill>
+              <a:srgbClr val="210F01"/>
+            </a:solidFill>
+          </a:ln>
+        </p:spPr>
+        <p:style>
+          <a:lnRef idx="2">
+            <a:schemeClr val="accent1">
+              <a:shade val="50000"/>
+            </a:schemeClr>
+          </a:lnRef>
+          <a:fillRef idx="1">
+            <a:schemeClr val="accent1"/>
+          </a:fillRef>
+          <a:effectRef idx="0">
+            <a:schemeClr val="accent1"/>
+          </a:effectRef>
+          <a:fontRef idx="minor">
+            <a:schemeClr val="lt1"/>
+          </a:fontRef>
+        </p:style>
+        <p:txBody>
+          <a:bodyPr rtlCol="0" anchor="ctr"/>
+          <a:lstStyle/>
+          <a:p>
+            <a:pPr algn="ctr"/>
+            <a:r>
+              <a:rPr lang="en-US" dirty="0" err="1" smtClean="0"/>
+              <a:t>mo</a:t>
+            </a:r>
+            <a:r>
+              <a:rPr lang="en-US" dirty="0" smtClean="0"/>
+              <a:t>-math</a:t>
+            </a:r>
+            <a:endParaRPr lang="en-US" dirty="0"/>
+          </a:p>
+        </p:txBody>
+      </p:sp>
+      <p:sp>
+        <p:nvSpPr>
+          <p:cNvPr id="5" name="Rectangle 4"/>
+          <p:cNvSpPr/>
+          <p:nvPr/>
+        </p:nvSpPr>
+        <p:spPr>
+          <a:xfrm>
+            <a:off x="4974207" y="5891482"/>
+            <a:ext cx="1872208" cy="432048"/>
+          </a:xfrm>
+          <a:prstGeom prst="rect">
+            <a:avLst/>
+          </a:prstGeom>
+          <a:solidFill>
+            <a:srgbClr val="683104"/>
+          </a:solidFill>
+          <a:ln>
+            <a:solidFill>
+              <a:srgbClr val="210F01"/>
+            </a:solidFill>
+          </a:ln>
+        </p:spPr>
+        <p:style>
+          <a:lnRef idx="2">
+            <a:schemeClr val="accent1">
+              <a:shade val="50000"/>
+            </a:schemeClr>
+          </a:lnRef>
+          <a:fillRef idx="1">
+            <a:schemeClr val="accent1"/>
+          </a:fillRef>
+          <a:effectRef idx="0">
+            <a:schemeClr val="accent1"/>
+          </a:effectRef>
+          <a:fontRef idx="minor">
+            <a:schemeClr val="lt1"/>
+          </a:fontRef>
+        </p:style>
+        <p:txBody>
+          <a:bodyPr rtlCol="0" anchor="ctr"/>
+          <a:lstStyle/>
+          <a:p>
+            <a:pPr algn="ctr"/>
+            <a:r>
+              <a:rPr lang="en-US" dirty="0" err="1" smtClean="0"/>
+              <a:t>mo-json</a:t>
+            </a:r>
+            <a:endParaRPr lang="en-US" dirty="0" smtClean="0"/>
+          </a:p>
+        </p:txBody>
+      </p:sp>
+      <p:cxnSp>
+        <p:nvCxnSpPr>
+          <p:cNvPr id="140" name="Straight Arrow Connector 139"/>
+          <p:cNvCxnSpPr>
+            <a:stCxn id="13" idx="2"/>
+            <a:endCxn id="113" idx="0"/>
+          </p:cNvCxnSpPr>
+          <p:nvPr/>
+        </p:nvCxnSpPr>
+        <p:spPr>
+          <a:xfrm flipH="1">
+            <a:off x="1249322" y="1300975"/>
+            <a:ext cx="1421784" cy="751660"/>
+          </a:xfrm>
+          <a:prstGeom prst="straightConnector1">
+            <a:avLst/>
+          </a:prstGeom>
+          <a:ln w="38100">
+            <a:solidFill>
+              <a:schemeClr val="accent3">
+                <a:lumMod val="40000"/>
+                <a:lumOff val="60000"/>
+              </a:schemeClr>
+            </a:solidFill>
+            <a:tailEnd type="arrow"/>
+          </a:ln>
+        </p:spPr>
+        <p:style>
+          <a:lnRef idx="1">
+            <a:schemeClr val="accent1"/>
+          </a:lnRef>
+          <a:fillRef idx="0">
+            <a:schemeClr val="accent1"/>
+          </a:fillRef>
+          <a:effectRef idx="0">
+            <a:schemeClr val="accent1"/>
+          </a:effectRef>
+          <a:fontRef idx="minor">
+            <a:schemeClr val="tx1"/>
+          </a:fontRef>
+        </p:style>
+      </p:cxnSp>
+      <p:cxnSp>
+        <p:nvCxnSpPr>
+          <p:cNvPr id="116" name="Straight Arrow Connector 115"/>
+          <p:cNvCxnSpPr>
+            <a:stCxn id="10" idx="2"/>
+            <a:endCxn id="6" idx="3"/>
+          </p:cNvCxnSpPr>
+          <p:nvPr/>
+        </p:nvCxnSpPr>
+        <p:spPr>
+          <a:xfrm flipH="1">
+            <a:off x="2185426" y="1300975"/>
+            <a:ext cx="3724068" cy="2038235"/>
+          </a:xfrm>
+          <a:prstGeom prst="straightConnector1">
+            <a:avLst/>
+          </a:prstGeom>
+          <a:ln w="38100">
+            <a:solidFill>
+              <a:srgbClr val="BED395"/>
+            </a:solidFill>
+            <a:tailEnd type="arrow"/>
+          </a:ln>
+        </p:spPr>
+        <p:style>
+          <a:lnRef idx="1">
+            <a:schemeClr val="accent1"/>
+          </a:lnRef>
+          <a:fillRef idx="0">
+            <a:schemeClr val="accent1"/>
+          </a:fillRef>
+          <a:effectRef idx="0">
+            <a:schemeClr val="accent1"/>
+          </a:effectRef>
+          <a:fontRef idx="minor">
+            <a:schemeClr val="tx1"/>
+          </a:fontRef>
+        </p:style>
+      </p:cxnSp>
+      <p:sp>
+        <p:nvSpPr>
+          <p:cNvPr id="6" name="Rectangle 5"/>
+          <p:cNvSpPr/>
+          <p:nvPr/>
+        </p:nvSpPr>
+        <p:spPr>
+          <a:xfrm>
+            <a:off x="313218" y="3123186"/>
+            <a:ext cx="1872208" cy="432048"/>
+          </a:xfrm>
+          <a:prstGeom prst="rect">
+            <a:avLst/>
+          </a:prstGeom>
+          <a:solidFill>
+            <a:srgbClr val="683104"/>
+          </a:solidFill>
+          <a:ln>
+            <a:solidFill>
+              <a:srgbClr val="210F01"/>
+            </a:solidFill>
+          </a:ln>
+        </p:spPr>
+        <p:style>
+          <a:lnRef idx="2">
+            <a:schemeClr val="accent1">
+              <a:shade val="50000"/>
+            </a:schemeClr>
+          </a:lnRef>
+          <a:fillRef idx="1">
+            <a:schemeClr val="accent1"/>
+          </a:fillRef>
+          <a:effectRef idx="0">
+            <a:schemeClr val="accent1"/>
+          </a:effectRef>
+          <a:fontRef idx="minor">
+            <a:schemeClr val="lt1"/>
+          </a:fontRef>
+        </p:style>
+        <p:txBody>
+          <a:bodyPr rtlCol="0" anchor="ctr"/>
+          <a:lstStyle/>
+          <a:p>
+            <a:pPr algn="ctr"/>
+            <a:r>
+              <a:rPr lang="en-US" dirty="0" err="1" smtClean="0"/>
+              <a:t>mo</a:t>
+            </a:r>
+            <a:r>
+              <a:rPr lang="en-US" dirty="0" smtClean="0"/>
+              <a:t>-collections</a:t>
+            </a:r>
+            <a:endParaRPr lang="en-US" dirty="0"/>
+          </a:p>
+        </p:txBody>
+      </p:sp>
+      <p:cxnSp>
+        <p:nvCxnSpPr>
           <p:cNvPr id="49" name="Straight Arrow Connector 48"/>
           <p:cNvCxnSpPr>
             <a:stCxn id="13" idx="2"/>
-            <a:endCxn id="9" idx="0"/>
+            <a:endCxn id="9" idx="1"/>
           </p:cNvCxnSpPr>
           <p:nvPr/>
         </p:nvCxnSpPr>
         <p:spPr>
           <a:xfrm>
-            <a:off x="2671106" y="764704"/>
-            <a:ext cx="1180814" cy="640495"/>
+            <a:off x="2671106" y="1300975"/>
+            <a:ext cx="4333837" cy="1170727"/>
+          </a:xfrm>
+          <a:prstGeom prst="straightConnector1">
+            <a:avLst/>
+          </a:prstGeom>
+          <a:ln w="38100">
+            <a:solidFill>
+              <a:schemeClr val="accent3">
+                <a:lumMod val="40000"/>
+                <a:lumOff val="60000"/>
+              </a:schemeClr>
+            </a:solidFill>
+            <a:tailEnd type="arrow"/>
+          </a:ln>
+        </p:spPr>
+        <p:style>
+          <a:lnRef idx="1">
+            <a:schemeClr val="accent1"/>
+          </a:lnRef>
+          <a:fillRef idx="0">
+            <a:schemeClr val="accent1"/>
+          </a:fillRef>
+          <a:effectRef idx="0">
+            <a:schemeClr val="accent1"/>
+          </a:effectRef>
+          <a:fontRef idx="minor">
+            <a:schemeClr val="tx1"/>
+          </a:fontRef>
+        </p:style>
+      </p:cxnSp>
+      <p:cxnSp>
+        <p:nvCxnSpPr>
+          <p:cNvPr id="238" name="Straight Arrow Connector 237"/>
+          <p:cNvCxnSpPr>
+            <a:stCxn id="6" idx="2"/>
+            <a:endCxn id="8" idx="0"/>
+          </p:cNvCxnSpPr>
+          <p:nvPr/>
+        </p:nvCxnSpPr>
+        <p:spPr>
+          <a:xfrm>
+            <a:off x="1249322" y="3555234"/>
+            <a:ext cx="0" cy="900792"/>
           </a:xfrm>
           <a:prstGeom prst="straightConnector1">
             <a:avLst/>
@@ -3861,74 +4591,19 @@
           </a:fontRef>
         </p:style>
       </p:cxnSp>
-      <p:sp>
-        <p:nvSpPr>
-          <p:cNvPr id="10" name="Rectangle 9"/>
-          <p:cNvSpPr/>
-          <p:nvPr/>
-        </p:nvSpPr>
-        <p:spPr>
-          <a:xfrm>
-            <a:off x="4973390" y="332656"/>
-            <a:ext cx="1872208" cy="432048"/>
-          </a:xfrm>
-          <a:prstGeom prst="rect">
-            <a:avLst/>
-          </a:prstGeom>
-          <a:solidFill>
-            <a:srgbClr val="683104"/>
-          </a:solidFill>
-          <a:ln>
-            <a:solidFill>
-              <a:srgbClr val="210F01"/>
-            </a:solidFill>
-          </a:ln>
-        </p:spPr>
-        <p:style>
-          <a:lnRef idx="2">
-            <a:schemeClr val="accent1">
-              <a:shade val="50000"/>
-            </a:schemeClr>
-          </a:lnRef>
-          <a:fillRef idx="1">
-            <a:schemeClr val="accent1"/>
-          </a:fillRef>
-          <a:effectRef idx="0">
-            <a:schemeClr val="accent1"/>
-          </a:effectRef>
-          <a:fontRef idx="minor">
-            <a:schemeClr val="lt1"/>
-          </a:fontRef>
-        </p:style>
-        <p:txBody>
-          <a:bodyPr rtlCol="0" anchor="ctr"/>
-          <a:lstStyle/>
-          <a:p>
-            <a:pPr algn="ctr"/>
-            <a:r>
-              <a:rPr lang="en-US" dirty="0" err="1" smtClean="0"/>
-              <a:t>mo</a:t>
-            </a:r>
-            <a:r>
-              <a:rPr lang="en-US" dirty="0" smtClean="0"/>
-              <a:t>-logs</a:t>
-            </a:r>
-          </a:p>
-        </p:txBody>
-      </p:sp>
       <p:cxnSp>
         <p:nvCxnSpPr>
-          <p:cNvPr id="52" name="Straight Arrow Connector 51"/>
+          <p:cNvPr id="239" name="Straight Arrow Connector 238"/>
           <p:cNvCxnSpPr>
-            <a:stCxn id="4" idx="2"/>
-            <a:endCxn id="5" idx="0"/>
+            <a:stCxn id="9" idx="2"/>
+            <a:endCxn id="8" idx="3"/>
           </p:cNvCxnSpPr>
           <p:nvPr/>
         </p:nvCxnSpPr>
         <p:spPr>
           <a:xfrm flipH="1">
-            <a:off x="1457673" y="2909790"/>
-            <a:ext cx="1958686" cy="375194"/>
+            <a:off x="2185426" y="2687726"/>
+            <a:ext cx="5755621" cy="1984324"/>
           </a:xfrm>
           <a:prstGeom prst="straightConnector1">
             <a:avLst/>
@@ -3959,17 +4634,17 @@
       </p:cxnSp>
       <p:cxnSp>
         <p:nvCxnSpPr>
-          <p:cNvPr id="63" name="Straight Arrow Connector 62"/>
+          <p:cNvPr id="52" name="Straight Arrow Connector 51"/>
           <p:cNvCxnSpPr>
-            <a:stCxn id="13" idx="2"/>
-            <a:endCxn id="12" idx="0"/>
+            <a:stCxn id="4" idx="2"/>
+            <a:endCxn id="5" idx="0"/>
           </p:cNvCxnSpPr>
           <p:nvPr/>
         </p:nvCxnSpPr>
         <p:spPr>
-          <a:xfrm>
-            <a:off x="2671106" y="764704"/>
-            <a:ext cx="4349166" cy="640495"/>
+          <a:xfrm flipH="1">
+            <a:off x="5910311" y="4066085"/>
+            <a:ext cx="2001842" cy="1825397"/>
           </a:xfrm>
           <a:prstGeom prst="straightConnector1">
             <a:avLst/>
@@ -3998,103 +4673,6 @@
           </a:fontRef>
         </p:style>
       </p:cxnSp>
-      <p:cxnSp>
-        <p:nvCxnSpPr>
-          <p:cNvPr id="64" name="Straight Arrow Connector 63"/>
-          <p:cNvCxnSpPr>
-            <a:stCxn id="10" idx="2"/>
-            <a:endCxn id="12" idx="0"/>
-          </p:cNvCxnSpPr>
-          <p:nvPr/>
-        </p:nvCxnSpPr>
-        <p:spPr>
-          <a:xfrm>
-            <a:off x="5909494" y="764704"/>
-            <a:ext cx="1110778" cy="640495"/>
-          </a:xfrm>
-          <a:prstGeom prst="straightConnector1">
-            <a:avLst/>
-          </a:prstGeom>
-          <a:ln w="38100">
-            <a:solidFill>
-              <a:schemeClr val="accent3">
-                <a:lumMod val="75000"/>
-              </a:schemeClr>
-            </a:solidFill>
-            <a:tailEnd type="arrow"/>
-          </a:ln>
-        </p:spPr>
-        <p:style>
-          <a:lnRef idx="1">
-            <a:schemeClr val="accent1"/>
-          </a:lnRef>
-          <a:fillRef idx="0">
-            <a:schemeClr val="accent1"/>
-          </a:fillRef>
-          <a:effectRef idx="0">
-            <a:schemeClr val="accent1"/>
-          </a:effectRef>
-          <a:fontRef idx="minor">
-            <a:schemeClr val="tx1"/>
-          </a:fontRef>
-        </p:style>
-      </p:cxnSp>
-      <p:sp>
-        <p:nvSpPr>
-          <p:cNvPr id="9" name="Rectangle 8"/>
-          <p:cNvSpPr/>
-          <p:nvPr/>
-        </p:nvSpPr>
-        <p:spPr>
-          <a:xfrm>
-            <a:off x="2915816" y="1405199"/>
-            <a:ext cx="1872208" cy="432048"/>
-          </a:xfrm>
-          <a:prstGeom prst="rect">
-            <a:avLst/>
-          </a:prstGeom>
-          <a:solidFill>
-            <a:srgbClr val="683104"/>
-          </a:solidFill>
-          <a:ln>
-            <a:solidFill>
-              <a:srgbClr val="210F01"/>
-            </a:solidFill>
-          </a:ln>
-        </p:spPr>
-        <p:style>
-          <a:lnRef idx="2">
-            <a:schemeClr val="accent1">
-              <a:shade val="50000"/>
-            </a:schemeClr>
-          </a:lnRef>
-          <a:fillRef idx="1">
-            <a:schemeClr val="accent1"/>
-          </a:fillRef>
-          <a:effectRef idx="0">
-            <a:schemeClr val="accent1"/>
-          </a:effectRef>
-          <a:fontRef idx="minor">
-            <a:schemeClr val="lt1"/>
-          </a:fontRef>
-        </p:style>
-        <p:txBody>
-          <a:bodyPr rtlCol="0" anchor="ctr"/>
-          <a:lstStyle/>
-          <a:p>
-            <a:pPr algn="ctr"/>
-            <a:r>
-              <a:rPr lang="en-US" dirty="0" err="1" smtClean="0"/>
-              <a:t>mo</a:t>
-            </a:r>
-            <a:r>
-              <a:rPr lang="en-US" dirty="0" smtClean="0"/>
-              <a:t>-math</a:t>
-            </a:r>
-            <a:endParaRPr lang="en-US" dirty="0"/>
-          </a:p>
-        </p:txBody>
-      </p:sp>
     </p:spTree>
     <p:extLst>
       <p:ext uri="{BB962C8B-B14F-4D97-AF65-F5344CB8AC3E}">

</xml_diff>

<commit_message>
updates from other projects
</commit_message>
<xml_diff>
--- a/docs/Libraries.pptx
+++ b/docs/Libraries.pptx
@@ -288,7 +288,7 @@
           <a:p>
             <a:fld id="{71FA50F8-8A97-411C-9AF9-ACDD92B44EEA}" type="datetimeFigureOut">
               <a:rPr lang="en-US" smtClean="0"/>
-              <a:t>2/8/2017</a:t>
+              <a:t>1/25/2019</a:t>
             </a:fld>
             <a:endParaRPr lang="en-US"/>
           </a:p>
@@ -458,7 +458,7 @@
           <a:p>
             <a:fld id="{71FA50F8-8A97-411C-9AF9-ACDD92B44EEA}" type="datetimeFigureOut">
               <a:rPr lang="en-US" smtClean="0"/>
-              <a:t>2/8/2017</a:t>
+              <a:t>1/25/2019</a:t>
             </a:fld>
             <a:endParaRPr lang="en-US"/>
           </a:p>
@@ -638,7 +638,7 @@
           <a:p>
             <a:fld id="{71FA50F8-8A97-411C-9AF9-ACDD92B44EEA}" type="datetimeFigureOut">
               <a:rPr lang="en-US" smtClean="0"/>
-              <a:t>2/8/2017</a:t>
+              <a:t>1/25/2019</a:t>
             </a:fld>
             <a:endParaRPr lang="en-US"/>
           </a:p>
@@ -808,7 +808,7 @@
           <a:p>
             <a:fld id="{71FA50F8-8A97-411C-9AF9-ACDD92B44EEA}" type="datetimeFigureOut">
               <a:rPr lang="en-US" smtClean="0"/>
-              <a:t>2/8/2017</a:t>
+              <a:t>1/25/2019</a:t>
             </a:fld>
             <a:endParaRPr lang="en-US"/>
           </a:p>
@@ -1054,7 +1054,7 @@
           <a:p>
             <a:fld id="{71FA50F8-8A97-411C-9AF9-ACDD92B44EEA}" type="datetimeFigureOut">
               <a:rPr lang="en-US" smtClean="0"/>
-              <a:t>2/8/2017</a:t>
+              <a:t>1/25/2019</a:t>
             </a:fld>
             <a:endParaRPr lang="en-US"/>
           </a:p>
@@ -1342,7 +1342,7 @@
           <a:p>
             <a:fld id="{71FA50F8-8A97-411C-9AF9-ACDD92B44EEA}" type="datetimeFigureOut">
               <a:rPr lang="en-US" smtClean="0"/>
-              <a:t>2/8/2017</a:t>
+              <a:t>1/25/2019</a:t>
             </a:fld>
             <a:endParaRPr lang="en-US"/>
           </a:p>
@@ -1764,7 +1764,7 @@
           <a:p>
             <a:fld id="{71FA50F8-8A97-411C-9AF9-ACDD92B44EEA}" type="datetimeFigureOut">
               <a:rPr lang="en-US" smtClean="0"/>
-              <a:t>2/8/2017</a:t>
+              <a:t>1/25/2019</a:t>
             </a:fld>
             <a:endParaRPr lang="en-US"/>
           </a:p>
@@ -1882,7 +1882,7 @@
           <a:p>
             <a:fld id="{71FA50F8-8A97-411C-9AF9-ACDD92B44EEA}" type="datetimeFigureOut">
               <a:rPr lang="en-US" smtClean="0"/>
-              <a:t>2/8/2017</a:t>
+              <a:t>1/25/2019</a:t>
             </a:fld>
             <a:endParaRPr lang="en-US"/>
           </a:p>
@@ -1977,7 +1977,7 @@
           <a:p>
             <a:fld id="{71FA50F8-8A97-411C-9AF9-ACDD92B44EEA}" type="datetimeFigureOut">
               <a:rPr lang="en-US" smtClean="0"/>
-              <a:t>2/8/2017</a:t>
+              <a:t>1/25/2019</a:t>
             </a:fld>
             <a:endParaRPr lang="en-US"/>
           </a:p>
@@ -2254,7 +2254,7 @@
           <a:p>
             <a:fld id="{71FA50F8-8A97-411C-9AF9-ACDD92B44EEA}" type="datetimeFigureOut">
               <a:rPr lang="en-US" smtClean="0"/>
-              <a:t>2/8/2017</a:t>
+              <a:t>1/25/2019</a:t>
             </a:fld>
             <a:endParaRPr lang="en-US"/>
           </a:p>
@@ -2507,7 +2507,7 @@
           <a:p>
             <a:fld id="{71FA50F8-8A97-411C-9AF9-ACDD92B44EEA}" type="datetimeFigureOut">
               <a:rPr lang="en-US" smtClean="0"/>
-              <a:t>2/8/2017</a:t>
+              <a:t>1/25/2019</a:t>
             </a:fld>
             <a:endParaRPr lang="en-US"/>
           </a:p>
@@ -2720,7 +2720,7 @@
           <a:p>
             <a:fld id="{71FA50F8-8A97-411C-9AF9-ACDD92B44EEA}" type="datetimeFigureOut">
               <a:rPr lang="en-US" smtClean="0"/>
-              <a:t>2/8/2017</a:t>
+              <a:t>1/25/2019</a:t>
             </a:fld>
             <a:endParaRPr lang="en-US"/>
           </a:p>
@@ -3470,9 +3470,7 @@
           </a:prstGeom>
           <a:ln w="38100">
             <a:solidFill>
-              <a:schemeClr val="accent3">
-                <a:lumMod val="75000"/>
-              </a:schemeClr>
+              <a:srgbClr val="3E4D1F"/>
             </a:solidFill>
             <a:tailEnd type="arrow"/>
           </a:ln>
@@ -3553,9 +3551,7 @@
           </a:prstGeom>
           <a:ln w="38100">
             <a:solidFill>
-              <a:schemeClr val="accent3">
-                <a:lumMod val="75000"/>
-              </a:schemeClr>
+              <a:srgbClr val="3E4D1F"/>
             </a:solidFill>
             <a:tailEnd type="arrow"/>
           </a:ln>
@@ -3675,48 +3671,7 @@
           </a:prstGeom>
           <a:ln w="38100">
             <a:solidFill>
-              <a:schemeClr val="accent3">
-                <a:lumMod val="75000"/>
-              </a:schemeClr>
-            </a:solidFill>
-            <a:tailEnd type="arrow"/>
-          </a:ln>
-        </p:spPr>
-        <p:style>
-          <a:lnRef idx="1">
-            <a:schemeClr val="accent1"/>
-          </a:lnRef>
-          <a:fillRef idx="0">
-            <a:schemeClr val="accent1"/>
-          </a:fillRef>
-          <a:effectRef idx="0">
-            <a:schemeClr val="accent1"/>
-          </a:effectRef>
-          <a:fontRef idx="minor">
-            <a:schemeClr val="tx1"/>
-          </a:fontRef>
-        </p:style>
-      </p:cxnSp>
-      <p:cxnSp>
-        <p:nvCxnSpPr>
-          <p:cNvPr id="44" name="Straight Arrow Connector 43"/>
-          <p:cNvCxnSpPr>
-            <a:stCxn id="10" idx="2"/>
-            <a:endCxn id="9" idx="0"/>
-          </p:cNvCxnSpPr>
-          <p:nvPr/>
-        </p:nvCxnSpPr>
-        <p:spPr>
-          <a:xfrm>
-            <a:off x="5909494" y="1300975"/>
-            <a:ext cx="2031553" cy="954703"/>
-          </a:xfrm>
-          <a:prstGeom prst="straightConnector1">
-            <a:avLst/>
-          </a:prstGeom>
-          <a:ln w="38100">
-            <a:solidFill>
-              <a:srgbClr val="BED395"/>
+              <a:srgbClr val="3E4D1F"/>
             </a:solidFill>
             <a:tailEnd type="arrow"/>
           </a:ln>
@@ -3878,9 +3833,7 @@
           </a:prstGeom>
           <a:ln w="38100">
             <a:solidFill>
-              <a:schemeClr val="accent3">
-                <a:lumMod val="75000"/>
-              </a:schemeClr>
+              <a:srgbClr val="3E4D1F"/>
             </a:solidFill>
             <a:tailEnd type="arrow"/>
           </a:ln>
@@ -4403,9 +4356,7 @@
           </a:prstGeom>
           <a:ln w="38100">
             <a:solidFill>
-              <a:schemeClr val="accent3">
-                <a:lumMod val="75000"/>
-              </a:schemeClr>
+              <a:srgbClr val="3E4D1F"/>
             </a:solidFill>
             <a:tailEnd type="arrow"/>
           </a:ln>
@@ -4444,9 +4395,7 @@
           </a:prstGeom>
           <a:ln w="38100">
             <a:solidFill>
-              <a:schemeClr val="accent3">
-                <a:lumMod val="75000"/>
-              </a:schemeClr>
+              <a:srgbClr val="3E4D1F"/>
             </a:solidFill>
             <a:tailEnd type="arrow"/>
           </a:ln>
@@ -4485,9 +4434,7 @@
           </a:prstGeom>
           <a:ln w="38100">
             <a:solidFill>
-              <a:schemeClr val="accent3">
-                <a:lumMod val="75000"/>
-              </a:schemeClr>
+              <a:srgbClr val="3E4D1F"/>
             </a:solidFill>
             <a:tailEnd type="arrow"/>
           </a:ln>
@@ -4673,6 +4620,45 @@
           </a:p>
         </p:txBody>
       </p:sp>
+      <p:cxnSp>
+        <p:nvCxnSpPr>
+          <p:cNvPr id="44" name="Straight Arrow Connector 43"/>
+          <p:cNvCxnSpPr>
+            <a:stCxn id="10" idx="2"/>
+            <a:endCxn id="9" idx="0"/>
+          </p:cNvCxnSpPr>
+          <p:nvPr/>
+        </p:nvCxnSpPr>
+        <p:spPr>
+          <a:xfrm>
+            <a:off x="5909494" y="1300975"/>
+            <a:ext cx="2031553" cy="954703"/>
+          </a:xfrm>
+          <a:prstGeom prst="straightConnector1">
+            <a:avLst/>
+          </a:prstGeom>
+          <a:ln w="38100">
+            <a:solidFill>
+              <a:srgbClr val="BED395"/>
+            </a:solidFill>
+            <a:tailEnd type="arrow"/>
+          </a:ln>
+        </p:spPr>
+        <p:style>
+          <a:lnRef idx="1">
+            <a:schemeClr val="accent1"/>
+          </a:lnRef>
+          <a:fillRef idx="0">
+            <a:schemeClr val="accent1"/>
+          </a:fillRef>
+          <a:effectRef idx="0">
+            <a:schemeClr val="accent1"/>
+          </a:effectRef>
+          <a:fontRef idx="minor">
+            <a:schemeClr val="tx1"/>
+          </a:fontRef>
+        </p:style>
+      </p:cxnSp>
     </p:spTree>
     <p:extLst>
       <p:ext uri="{BB962C8B-B14F-4D97-AF65-F5344CB8AC3E}">

</xml_diff>